<commit_message>
added support for PLINK files (untested)
</commit_message>
<xml_diff>
--- a/notes/find_happair.pptx
+++ b/notes/find_happair.pptx
@@ -196,7 +196,7 @@
           <a:p>
             <a:fld id="{A2EC2A37-4D6E-CE44-B06A-DDFCA2405912}" type="datetimeFigureOut">
               <a:rPr lang="en-US" smtClean="0"/>
-              <a:t>20/5/10</a:t>
+              <a:t>20/5/12</a:t>
             </a:fld>
             <a:endParaRPr lang="en-US"/>
           </a:p>
@@ -361,7 +361,7 @@
           <a:p>
             <a:fld id="{CC080649-E2DC-3249-A1CF-F2987A3EA454}" type="datetimeFigureOut">
               <a:rPr lang="en-US" smtClean="0"/>
-              <a:t>20/5/10</a:t>
+              <a:t>20/5/12</a:t>
             </a:fld>
             <a:endParaRPr lang="en-US"/>
           </a:p>
@@ -894,7 +894,7 @@
           <a:p>
             <a:fld id="{BF8ED42D-A53E-334E-8861-8CC981FA9259}" type="datetimeFigureOut">
               <a:rPr lang="en-US" smtClean="0"/>
-              <a:t>20/5/10</a:t>
+              <a:t>20/5/12</a:t>
             </a:fld>
             <a:endParaRPr lang="en-US"/>
           </a:p>
@@ -1064,7 +1064,7 @@
           <a:p>
             <a:fld id="{BF8ED42D-A53E-334E-8861-8CC981FA9259}" type="datetimeFigureOut">
               <a:rPr lang="en-US" smtClean="0"/>
-              <a:t>20/5/10</a:t>
+              <a:t>20/5/12</a:t>
             </a:fld>
             <a:endParaRPr lang="en-US"/>
           </a:p>
@@ -1244,7 +1244,7 @@
           <a:p>
             <a:fld id="{BF8ED42D-A53E-334E-8861-8CC981FA9259}" type="datetimeFigureOut">
               <a:rPr lang="en-US" smtClean="0"/>
-              <a:t>20/5/10</a:t>
+              <a:t>20/5/12</a:t>
             </a:fld>
             <a:endParaRPr lang="en-US"/>
           </a:p>
@@ -1414,7 +1414,7 @@
           <a:p>
             <a:fld id="{BF8ED42D-A53E-334E-8861-8CC981FA9259}" type="datetimeFigureOut">
               <a:rPr lang="en-US" smtClean="0"/>
-              <a:t>20/5/10</a:t>
+              <a:t>20/5/12</a:t>
             </a:fld>
             <a:endParaRPr lang="en-US"/>
           </a:p>
@@ -1660,7 +1660,7 @@
           <a:p>
             <a:fld id="{BF8ED42D-A53E-334E-8861-8CC981FA9259}" type="datetimeFigureOut">
               <a:rPr lang="en-US" smtClean="0"/>
-              <a:t>20/5/10</a:t>
+              <a:t>20/5/12</a:t>
             </a:fld>
             <a:endParaRPr lang="en-US"/>
           </a:p>
@@ -1948,7 +1948,7 @@
           <a:p>
             <a:fld id="{BF8ED42D-A53E-334E-8861-8CC981FA9259}" type="datetimeFigureOut">
               <a:rPr lang="en-US" smtClean="0"/>
-              <a:t>20/5/10</a:t>
+              <a:t>20/5/12</a:t>
             </a:fld>
             <a:endParaRPr lang="en-US"/>
           </a:p>
@@ -2370,7 +2370,7 @@
           <a:p>
             <a:fld id="{BF8ED42D-A53E-334E-8861-8CC981FA9259}" type="datetimeFigureOut">
               <a:rPr lang="en-US" smtClean="0"/>
-              <a:t>20/5/10</a:t>
+              <a:t>20/5/12</a:t>
             </a:fld>
             <a:endParaRPr lang="en-US"/>
           </a:p>
@@ -2488,7 +2488,7 @@
           <a:p>
             <a:fld id="{BF8ED42D-A53E-334E-8861-8CC981FA9259}" type="datetimeFigureOut">
               <a:rPr lang="en-US" smtClean="0"/>
-              <a:t>20/5/10</a:t>
+              <a:t>20/5/12</a:t>
             </a:fld>
             <a:endParaRPr lang="en-US"/>
           </a:p>
@@ -2583,7 +2583,7 @@
           <a:p>
             <a:fld id="{BF8ED42D-A53E-334E-8861-8CC981FA9259}" type="datetimeFigureOut">
               <a:rPr lang="en-US" smtClean="0"/>
-              <a:t>20/5/10</a:t>
+              <a:t>20/5/12</a:t>
             </a:fld>
             <a:endParaRPr lang="en-US"/>
           </a:p>
@@ -2860,7 +2860,7 @@
           <a:p>
             <a:fld id="{BF8ED42D-A53E-334E-8861-8CC981FA9259}" type="datetimeFigureOut">
               <a:rPr lang="en-US" smtClean="0"/>
-              <a:t>20/5/10</a:t>
+              <a:t>20/5/12</a:t>
             </a:fld>
             <a:endParaRPr lang="en-US"/>
           </a:p>
@@ -3113,7 +3113,7 @@
           <a:p>
             <a:fld id="{BF8ED42D-A53E-334E-8861-8CC981FA9259}" type="datetimeFigureOut">
               <a:rPr lang="en-US" smtClean="0"/>
-              <a:t>20/5/10</a:t>
+              <a:t>20/5/12</a:t>
             </a:fld>
             <a:endParaRPr lang="en-US"/>
           </a:p>
@@ -3326,7 +3326,7 @@
           <a:p>
             <a:fld id="{BF8ED42D-A53E-334E-8861-8CC981FA9259}" type="datetimeFigureOut">
               <a:rPr lang="en-US" smtClean="0"/>
-              <a:t>20/5/10</a:t>
+              <a:t>20/5/12</a:t>
             </a:fld>
             <a:endParaRPr lang="en-US"/>
           </a:p>
@@ -3758,8 +3758,8 @@
         </p:nvSpPr>
         <p:spPr>
           <a:xfrm>
-            <a:off x="11338009" y="3576387"/>
-            <a:ext cx="3040983" cy="1248095"/>
+            <a:off x="11338009" y="3576388"/>
+            <a:ext cx="2936791" cy="1242260"/>
           </a:xfrm>
           <a:prstGeom prst="rect">
             <a:avLst/>
@@ -10201,7 +10201,7 @@
       </p:sp>
       <p:pic>
         <p:nvPicPr>
-          <p:cNvPr id="33" name="Picture 32" descr="(h_1,_h_4),_(h_1.pdf"/>
+          <p:cNvPr id="3" name="Picture 2" descr="(h_1,_h_4),_(h_1.pdf"/>
           <p:cNvPicPr>
             <a:picLocks noChangeAspect="1"/>
           </p:cNvPicPr>
@@ -10221,8 +10221,8 @@
         </p:blipFill>
         <p:spPr>
           <a:xfrm>
-            <a:off x="11488476" y="3696066"/>
-            <a:ext cx="2731076" cy="1047635"/>
+            <a:off x="11447761" y="3695002"/>
+            <a:ext cx="2725981" cy="1045680"/>
           </a:xfrm>
           <a:prstGeom prst="rect">
             <a:avLst/>

</xml_diff>